<commit_message>
Revised the pptx file on update screenshot output in the example code
</commit_message>
<xml_diff>
--- a/PHPFunctions.pptx
+++ b/PHPFunctions.pptx
@@ -6759,7 +6759,7 @@
           <a:p>
             <a:fld id="{68416927-5E9C-4E77-85FE-EE4C81C1DE39}" type="datetimeFigureOut">
               <a:rPr lang="en-US" smtClean="0"/>
-              <a:t>9/16/2020</a:t>
+              <a:t>9/17/2020</a:t>
             </a:fld>
             <a:endParaRPr lang="en-US" dirty="0"/>
           </a:p>
@@ -6936,7 +6936,7 @@
           <a:p>
             <a:fld id="{FA798B7E-6604-4F74-86DB-B30627D56244}" type="datetimeFigureOut">
               <a:rPr lang="en-US" smtClean="0"/>
-              <a:t>9/16/2020</a:t>
+              <a:t>9/17/2020</a:t>
             </a:fld>
             <a:endParaRPr lang="en-US" dirty="0"/>
           </a:p>
@@ -13245,7 +13245,37 @@
         <p:spPr>
           <a:xfrm>
             <a:off x="0" y="-1"/>
-            <a:ext cx="6305550" cy="3590925"/>
+            <a:ext cx="6305550" cy="3562351"/>
+          </a:xfrm>
+          <a:prstGeom prst="rect">
+            <a:avLst/>
+          </a:prstGeom>
+        </p:spPr>
+      </p:pic>
+      <p:pic>
+        <p:nvPicPr>
+          <p:cNvPr id="15" name="Picture 14">
+            <a:extLst>
+              <a:ext uri="{FF2B5EF4-FFF2-40B4-BE49-F238E27FC236}">
+                <a16:creationId xmlns:a16="http://schemas.microsoft.com/office/drawing/2014/main" id="{0547729B-5FCD-4808-8A06-C3B3A22D6E31}"/>
+              </a:ext>
+            </a:extLst>
+          </p:cNvPr>
+          <p:cNvPicPr>
+            <a:picLocks noChangeAspect="1"/>
+          </p:cNvPicPr>
+          <p:nvPr/>
+        </p:nvPicPr>
+        <p:blipFill>
+          <a:blip r:embed="rId4"/>
+          <a:stretch>
+            <a:fillRect/>
+          </a:stretch>
+        </p:blipFill>
+        <p:spPr>
+          <a:xfrm>
+            <a:off x="76201" y="3562350"/>
+            <a:ext cx="6229350" cy="2955120"/>
           </a:xfrm>
           <a:prstGeom prst="rect">
             <a:avLst/>
@@ -13254,10 +13284,10 @@
       </p:pic>
       <p:sp>
         <p:nvSpPr>
-          <p:cNvPr id="10" name="Picture Placeholder 9">
+          <p:cNvPr id="18" name="Picture Placeholder 17">
             <a:extLst>
               <a:ext uri="{FF2B5EF4-FFF2-40B4-BE49-F238E27FC236}">
-                <a16:creationId xmlns:a16="http://schemas.microsoft.com/office/drawing/2014/main" id="{19F5FDFA-06B9-4EFF-9B53-5EB04702AA94}"/>
+                <a16:creationId xmlns:a16="http://schemas.microsoft.com/office/drawing/2014/main" id="{8F21648C-B9FF-4205-BCEF-81DE0DF928BD}"/>
               </a:ext>
             </a:extLst>
           </p:cNvPr>
@@ -14672,12 +14702,12 @@
 </file>
 
 <file path=customXml/item1.xml><?xml version="1.0" encoding="utf-8"?>
-<?mso-contentType ?>
-<FormTemplates xmlns="http://schemas.microsoft.com/sharepoint/v3/contenttype/forms">
-  <Display>DocumentLibraryForm</Display>
-  <Edit>DocumentLibraryForm</Edit>
-  <New>DocumentLibraryForm</New>
-</FormTemplates>
+<p:properties xmlns:p="http://schemas.microsoft.com/office/2006/metadata/properties" xmlns:xsi="http://www.w3.org/2001/XMLSchema-instance" xmlns:pc="http://schemas.microsoft.com/office/infopath/2007/PartnerControls">
+  <documentManagement>
+    <Status xmlns="71af3243-3dd4-4a8d-8c0d-dd76da1f02a5">Not started</Status>
+    <MediaServiceKeyPoints xmlns="71af3243-3dd4-4a8d-8c0d-dd76da1f02a5" xsi:nil="true"/>
+  </documentManagement>
+</p:properties>
 </file>
 
 <file path=customXml/item2.xml><?xml version="1.0" encoding="utf-8"?>
@@ -14902,18 +14932,20 @@
 </file>
 
 <file path=customXml/item3.xml><?xml version="1.0" encoding="utf-8"?>
-<p:properties xmlns:p="http://schemas.microsoft.com/office/2006/metadata/properties" xmlns:xsi="http://www.w3.org/2001/XMLSchema-instance" xmlns:pc="http://schemas.microsoft.com/office/infopath/2007/PartnerControls">
-  <documentManagement>
-    <Status xmlns="71af3243-3dd4-4a8d-8c0d-dd76da1f02a5">Not started</Status>
-    <MediaServiceKeyPoints xmlns="71af3243-3dd4-4a8d-8c0d-dd76da1f02a5" xsi:nil="true"/>
-  </documentManagement>
-</p:properties>
+<?mso-contentType ?>
+<FormTemplates xmlns="http://schemas.microsoft.com/sharepoint/v3/contenttype/forms">
+  <Display>DocumentLibraryForm</Display>
+  <Edit>DocumentLibraryForm</Edit>
+  <New>DocumentLibraryForm</New>
+</FormTemplates>
 </file>
 
 <file path=customXml/itemProps1.xml><?xml version="1.0" encoding="utf-8"?>
-<ds:datastoreItem xmlns:ds="http://schemas.openxmlformats.org/officeDocument/2006/customXml" ds:itemID="{EBB7C387-AFDC-4FE3-A658-984B7F35F155}">
+<ds:datastoreItem xmlns:ds="http://schemas.openxmlformats.org/officeDocument/2006/customXml" ds:itemID="{F4E32C0B-4052-44CB-9341-8AD8B2CC4712}">
   <ds:schemaRefs>
-    <ds:schemaRef ds:uri="http://schemas.microsoft.com/sharepoint/v3/contenttype/forms"/>
+    <ds:schemaRef ds:uri="http://schemas.microsoft.com/office/2006/metadata/properties"/>
+    <ds:schemaRef ds:uri="http://schemas.microsoft.com/office/infopath/2007/PartnerControls"/>
+    <ds:schemaRef ds:uri="71af3243-3dd4-4a8d-8c0d-dd76da1f02a5"/>
   </ds:schemaRefs>
 </ds:datastoreItem>
 </file>
@@ -14938,11 +14970,9 @@
 </file>
 
 <file path=customXml/itemProps3.xml><?xml version="1.0" encoding="utf-8"?>
-<ds:datastoreItem xmlns:ds="http://schemas.openxmlformats.org/officeDocument/2006/customXml" ds:itemID="{F4E32C0B-4052-44CB-9341-8AD8B2CC4712}">
+<ds:datastoreItem xmlns:ds="http://schemas.openxmlformats.org/officeDocument/2006/customXml" ds:itemID="{EBB7C387-AFDC-4FE3-A658-984B7F35F155}">
   <ds:schemaRefs>
-    <ds:schemaRef ds:uri="http://schemas.microsoft.com/office/2006/metadata/properties"/>
-    <ds:schemaRef ds:uri="http://schemas.microsoft.com/office/infopath/2007/PartnerControls"/>
-    <ds:schemaRef ds:uri="71af3243-3dd4-4a8d-8c0d-dd76da1f02a5"/>
+    <ds:schemaRef ds:uri="http://schemas.microsoft.com/sharepoint/v3/contenttype/forms"/>
   </ds:schemaRefs>
 </ds:datastoreItem>
 </file>
</xml_diff>

<commit_message>
Feat(codebase): add loan disbursement and payment process
</commit_message>
<xml_diff>
--- a/PHPFunctions.pptx
+++ b/PHPFunctions.pptx
@@ -2793,7 +2793,7 @@
                 <a:schemeClr val="bg1"/>
               </a:solidFill>
             </a:rPr>
-            <a:t>Programming Syntax</a:t>
+            <a:t>Variables, Values and Data Types</a:t>
           </a:r>
         </a:p>
       </dgm:t>
@@ -2845,7 +2845,7 @@
                 <a:schemeClr val="bg1"/>
               </a:solidFill>
             </a:rPr>
-            <a:t>Variables, Values and Data Types</a:t>
+            <a:t>Arithmetic Operation</a:t>
           </a:r>
         </a:p>
       </dgm:t>
@@ -3943,7 +3943,7 @@
                 <a:schemeClr val="bg1"/>
               </a:solidFill>
             </a:rPr>
-            <a:t>Programming Syntax</a:t>
+            <a:t>Variables, Values and Data Types</a:t>
           </a:r>
         </a:p>
         <a:p>
@@ -3969,7 +3969,7 @@
                 <a:schemeClr val="bg1"/>
               </a:solidFill>
             </a:rPr>
-            <a:t>Variables, Values and Data Types</a:t>
+            <a:t>Arithmetic Operation</a:t>
           </a:r>
         </a:p>
         <a:p>
@@ -11552,7 +11552,7 @@
             <p:ph idx="1"/>
             <p:extLst>
               <p:ext uri="{D42A27DB-BD31-4B8C-83A1-F6EECF244321}">
-                <p14:modId xmlns:p14="http://schemas.microsoft.com/office/powerpoint/2010/main" val="4286337909"/>
+                <p14:modId xmlns:p14="http://schemas.microsoft.com/office/powerpoint/2010/main" val="2201906282"/>
               </p:ext>
             </p:extLst>
           </p:nvPr>
@@ -14702,12 +14702,12 @@
 </file>
 
 <file path=customXml/item1.xml><?xml version="1.0" encoding="utf-8"?>
-<p:properties xmlns:p="http://schemas.microsoft.com/office/2006/metadata/properties" xmlns:xsi="http://www.w3.org/2001/XMLSchema-instance" xmlns:pc="http://schemas.microsoft.com/office/infopath/2007/PartnerControls">
-  <documentManagement>
-    <Status xmlns="71af3243-3dd4-4a8d-8c0d-dd76da1f02a5">Not started</Status>
-    <MediaServiceKeyPoints xmlns="71af3243-3dd4-4a8d-8c0d-dd76da1f02a5" xsi:nil="true"/>
-  </documentManagement>
-</p:properties>
+<?mso-contentType ?>
+<FormTemplates xmlns="http://schemas.microsoft.com/sharepoint/v3/contenttype/forms">
+  <Display>DocumentLibraryForm</Display>
+  <Edit>DocumentLibraryForm</Edit>
+  <New>DocumentLibraryForm</New>
+</FormTemplates>
 </file>
 
 <file path=customXml/item2.xml><?xml version="1.0" encoding="utf-8"?>
@@ -14932,20 +14932,18 @@
 </file>
 
 <file path=customXml/item3.xml><?xml version="1.0" encoding="utf-8"?>
-<?mso-contentType ?>
-<FormTemplates xmlns="http://schemas.microsoft.com/sharepoint/v3/contenttype/forms">
-  <Display>DocumentLibraryForm</Display>
-  <Edit>DocumentLibraryForm</Edit>
-  <New>DocumentLibraryForm</New>
-</FormTemplates>
+<p:properties xmlns:p="http://schemas.microsoft.com/office/2006/metadata/properties" xmlns:xsi="http://www.w3.org/2001/XMLSchema-instance" xmlns:pc="http://schemas.microsoft.com/office/infopath/2007/PartnerControls">
+  <documentManagement>
+    <Status xmlns="71af3243-3dd4-4a8d-8c0d-dd76da1f02a5">Not started</Status>
+    <MediaServiceKeyPoints xmlns="71af3243-3dd4-4a8d-8c0d-dd76da1f02a5" xsi:nil="true"/>
+  </documentManagement>
+</p:properties>
 </file>
 
 <file path=customXml/itemProps1.xml><?xml version="1.0" encoding="utf-8"?>
-<ds:datastoreItem xmlns:ds="http://schemas.openxmlformats.org/officeDocument/2006/customXml" ds:itemID="{F4E32C0B-4052-44CB-9341-8AD8B2CC4712}">
+<ds:datastoreItem xmlns:ds="http://schemas.openxmlformats.org/officeDocument/2006/customXml" ds:itemID="{EBB7C387-AFDC-4FE3-A658-984B7F35F155}">
   <ds:schemaRefs>
-    <ds:schemaRef ds:uri="http://schemas.microsoft.com/office/2006/metadata/properties"/>
-    <ds:schemaRef ds:uri="http://schemas.microsoft.com/office/infopath/2007/PartnerControls"/>
-    <ds:schemaRef ds:uri="71af3243-3dd4-4a8d-8c0d-dd76da1f02a5"/>
+    <ds:schemaRef ds:uri="http://schemas.microsoft.com/sharepoint/v3/contenttype/forms"/>
   </ds:schemaRefs>
 </ds:datastoreItem>
 </file>
@@ -14970,9 +14968,11 @@
 </file>
 
 <file path=customXml/itemProps3.xml><?xml version="1.0" encoding="utf-8"?>
-<ds:datastoreItem xmlns:ds="http://schemas.openxmlformats.org/officeDocument/2006/customXml" ds:itemID="{EBB7C387-AFDC-4FE3-A658-984B7F35F155}">
+<ds:datastoreItem xmlns:ds="http://schemas.openxmlformats.org/officeDocument/2006/customXml" ds:itemID="{F4E32C0B-4052-44CB-9341-8AD8B2CC4712}">
   <ds:schemaRefs>
-    <ds:schemaRef ds:uri="http://schemas.microsoft.com/sharepoint/v3/contenttype/forms"/>
+    <ds:schemaRef ds:uri="http://schemas.microsoft.com/office/2006/metadata/properties"/>
+    <ds:schemaRef ds:uri="http://schemas.microsoft.com/office/infopath/2007/PartnerControls"/>
+    <ds:schemaRef ds:uri="71af3243-3dd4-4a8d-8c0d-dd76da1f02a5"/>
   </ds:schemaRefs>
 </ds:datastoreItem>
 </file>
</xml_diff>